<commit_message>
Added ui system diagram
</commit_message>
<xml_diff>
--- a/Presentation/Bioreactor Systems Control.pptx
+++ b/Presentation/Bioreactor Systems Control.pptx
@@ -11,6 +11,7 @@
     <p:sldId id="259" r:id="rId5"/>
     <p:sldId id="260" r:id="rId6"/>
     <p:sldId id="261" r:id="rId7"/>
+    <p:sldId id="262" r:id="rId8"/>
   </p:sldIdLst>
   <p:sldSz cx="12192000" cy="6858000"/>
   <p:notesSz cx="6858000" cy="9144000"/>
@@ -109,6 +110,11 @@
       </a:defRPr>
     </a:lvl9pPr>
   </p:defaultTextStyle>
+  <p:extLst>
+    <p:ext uri="{EFAFB233-063F-42B5-8137-9DF3F51BA10A}">
+      <p15:sldGuideLst xmlns:p15="http://schemas.microsoft.com/office/powerpoint/2012/main"/>
+    </p:ext>
+  </p:extLst>
 </p:presentation>
 </file>
 
@@ -261,7 +267,7 @@
           <a:p>
             <a:fld id="{E2827CD6-9C6C-4C06-A04D-1E642497B60F}" type="datetimeFigureOut">
               <a:rPr lang="en-GB" smtClean="0"/>
-              <a:t>10/12/2018</a:t>
+              <a:t>11/12/2018</a:t>
             </a:fld>
             <a:endParaRPr lang="en-GB"/>
           </a:p>
@@ -461,7 +467,7 @@
           <a:p>
             <a:fld id="{E2827CD6-9C6C-4C06-A04D-1E642497B60F}" type="datetimeFigureOut">
               <a:rPr lang="en-GB" smtClean="0"/>
-              <a:t>10/12/2018</a:t>
+              <a:t>11/12/2018</a:t>
             </a:fld>
             <a:endParaRPr lang="en-GB"/>
           </a:p>
@@ -671,7 +677,7 @@
           <a:p>
             <a:fld id="{E2827CD6-9C6C-4C06-A04D-1E642497B60F}" type="datetimeFigureOut">
               <a:rPr lang="en-GB" smtClean="0"/>
-              <a:t>10/12/2018</a:t>
+              <a:t>11/12/2018</a:t>
             </a:fld>
             <a:endParaRPr lang="en-GB"/>
           </a:p>
@@ -871,7 +877,7 @@
           <a:p>
             <a:fld id="{E2827CD6-9C6C-4C06-A04D-1E642497B60F}" type="datetimeFigureOut">
               <a:rPr lang="en-GB" smtClean="0"/>
-              <a:t>10/12/2018</a:t>
+              <a:t>11/12/2018</a:t>
             </a:fld>
             <a:endParaRPr lang="en-GB"/>
           </a:p>
@@ -1147,7 +1153,7 @@
           <a:p>
             <a:fld id="{E2827CD6-9C6C-4C06-A04D-1E642497B60F}" type="datetimeFigureOut">
               <a:rPr lang="en-GB" smtClean="0"/>
-              <a:t>10/12/2018</a:t>
+              <a:t>11/12/2018</a:t>
             </a:fld>
             <a:endParaRPr lang="en-GB"/>
           </a:p>
@@ -1415,7 +1421,7 @@
           <a:p>
             <a:fld id="{E2827CD6-9C6C-4C06-A04D-1E642497B60F}" type="datetimeFigureOut">
               <a:rPr lang="en-GB" smtClean="0"/>
-              <a:t>10/12/2018</a:t>
+              <a:t>11/12/2018</a:t>
             </a:fld>
             <a:endParaRPr lang="en-GB"/>
           </a:p>
@@ -1830,7 +1836,7 @@
           <a:p>
             <a:fld id="{E2827CD6-9C6C-4C06-A04D-1E642497B60F}" type="datetimeFigureOut">
               <a:rPr lang="en-GB" smtClean="0"/>
-              <a:t>10/12/2018</a:t>
+              <a:t>11/12/2018</a:t>
             </a:fld>
             <a:endParaRPr lang="en-GB"/>
           </a:p>
@@ -1972,7 +1978,7 @@
           <a:p>
             <a:fld id="{E2827CD6-9C6C-4C06-A04D-1E642497B60F}" type="datetimeFigureOut">
               <a:rPr lang="en-GB" smtClean="0"/>
-              <a:t>10/12/2018</a:t>
+              <a:t>11/12/2018</a:t>
             </a:fld>
             <a:endParaRPr lang="en-GB"/>
           </a:p>
@@ -2085,7 +2091,7 @@
           <a:p>
             <a:fld id="{E2827CD6-9C6C-4C06-A04D-1E642497B60F}" type="datetimeFigureOut">
               <a:rPr lang="en-GB" smtClean="0"/>
-              <a:t>10/12/2018</a:t>
+              <a:t>11/12/2018</a:t>
             </a:fld>
             <a:endParaRPr lang="en-GB"/>
           </a:p>
@@ -2398,7 +2404,7 @@
           <a:p>
             <a:fld id="{E2827CD6-9C6C-4C06-A04D-1E642497B60F}" type="datetimeFigureOut">
               <a:rPr lang="en-GB" smtClean="0"/>
-              <a:t>10/12/2018</a:t>
+              <a:t>11/12/2018</a:t>
             </a:fld>
             <a:endParaRPr lang="en-GB"/>
           </a:p>
@@ -2687,7 +2693,7 @@
           <a:p>
             <a:fld id="{E2827CD6-9C6C-4C06-A04D-1E642497B60F}" type="datetimeFigureOut">
               <a:rPr lang="en-GB" smtClean="0"/>
-              <a:t>10/12/2018</a:t>
+              <a:t>11/12/2018</a:t>
             </a:fld>
             <a:endParaRPr lang="en-GB"/>
           </a:p>
@@ -2930,7 +2936,7 @@
           <a:p>
             <a:fld id="{E2827CD6-9C6C-4C06-A04D-1E642497B60F}" type="datetimeFigureOut">
               <a:rPr lang="en-GB" smtClean="0"/>
-              <a:t>10/12/2018</a:t>
+              <a:t>11/12/2018</a:t>
             </a:fld>
             <a:endParaRPr lang="en-GB"/>
           </a:p>
@@ -5287,6 +5293,99 @@
 </p:sld>
 </file>
 
+<file path=ppt/slides/slide7.xml><?xml version="1.0" encoding="utf-8"?>
+<p:sld xmlns:a="http://schemas.openxmlformats.org/drawingml/2006/main" xmlns:r="http://schemas.openxmlformats.org/officeDocument/2006/relationships" xmlns:p="http://schemas.openxmlformats.org/presentationml/2006/main">
+  <p:cSld>
+    <p:spTree>
+      <p:nvGrpSpPr>
+        <p:cNvPr id="1" name=""/>
+        <p:cNvGrpSpPr/>
+        <p:nvPr/>
+      </p:nvGrpSpPr>
+      <p:grpSpPr>
+        <a:xfrm>
+          <a:off x="0" y="0"/>
+          <a:ext cx="0" cy="0"/>
+          <a:chOff x="0" y="0"/>
+          <a:chExt cx="0" cy="0"/>
+        </a:xfrm>
+      </p:grpSpPr>
+      <p:sp>
+        <p:nvSpPr>
+          <p:cNvPr id="2" name="Title 1">
+            <a:extLst>
+              <a:ext uri="{FF2B5EF4-FFF2-40B4-BE49-F238E27FC236}">
+                <a16:creationId xmlns:a16="http://schemas.microsoft.com/office/drawing/2014/main" id="{51D6BE6D-AD8A-4813-9D75-819AAC09D495}"/>
+              </a:ext>
+            </a:extLst>
+          </p:cNvPr>
+          <p:cNvSpPr>
+            <a:spLocks noGrp="1"/>
+          </p:cNvSpPr>
+          <p:nvPr>
+            <p:ph type="title"/>
+          </p:nvPr>
+        </p:nvSpPr>
+        <p:spPr/>
+        <p:txBody>
+          <a:bodyPr/>
+          <a:lstStyle/>
+          <a:p>
+            <a:r>
+              <a:rPr lang="en-GB" dirty="0"/>
+              <a:t>UI</a:t>
+            </a:r>
+          </a:p>
+        </p:txBody>
+      </p:sp>
+      <p:pic>
+        <p:nvPicPr>
+          <p:cNvPr id="23" name="Content Placeholder 22">
+            <a:extLst>
+              <a:ext uri="{FF2B5EF4-FFF2-40B4-BE49-F238E27FC236}">
+                <a16:creationId xmlns:a16="http://schemas.microsoft.com/office/drawing/2014/main" id="{7F5D63EA-5F0D-4C0D-A6A2-C4DEBFA08367}"/>
+              </a:ext>
+            </a:extLst>
+          </p:cNvPr>
+          <p:cNvPicPr>
+            <a:picLocks noGrp="1" noChangeAspect="1"/>
+          </p:cNvPicPr>
+          <p:nvPr>
+            <p:ph idx="1"/>
+          </p:nvPr>
+        </p:nvPicPr>
+        <p:blipFill>
+          <a:blip r:embed="rId2">
+            <a:extLst>
+              <a:ext uri="{28A0092B-C50C-407E-A947-70E740481C1C}">
+                <a14:useLocalDpi xmlns:a14="http://schemas.microsoft.com/office/drawing/2010/main" val="0"/>
+              </a:ext>
+            </a:extLst>
+          </a:blip>
+          <a:stretch>
+            <a:fillRect/>
+          </a:stretch>
+        </p:blipFill>
+        <p:spPr>
+          <a:xfrm>
+            <a:off x="1133475" y="1896269"/>
+            <a:ext cx="9925050" cy="4210050"/>
+          </a:xfrm>
+        </p:spPr>
+      </p:pic>
+    </p:spTree>
+    <p:extLst>
+      <p:ext uri="{BB962C8B-B14F-4D97-AF65-F5344CB8AC3E}">
+        <p14:creationId xmlns:p14="http://schemas.microsoft.com/office/powerpoint/2010/main" val="2203060729"/>
+      </p:ext>
+    </p:extLst>
+  </p:cSld>
+  <p:clrMapOvr>
+    <a:masterClrMapping/>
+  </p:clrMapOvr>
+</p:sld>
+</file>
+
 <file path=ppt/theme/theme1.xml><?xml version="1.0" encoding="utf-8"?>
 <a:theme xmlns:a="http://schemas.openxmlformats.org/drawingml/2006/main" name="Office Theme">
   <a:themeElements>

</xml_diff>